<commit_message>
Modification du V1 PPT
</commit_message>
<xml_diff>
--- a/RFID.pptx
+++ b/RFID.pptx
@@ -7,8 +7,16 @@
   <p:sldIdLst>
     <p:sldId id="256" r:id="rId2"/>
     <p:sldId id="257" r:id="rId3"/>
-    <p:sldId id="258" r:id="rId4"/>
-    <p:sldId id="259" r:id="rId5"/>
+    <p:sldId id="260" r:id="rId4"/>
+    <p:sldId id="261" r:id="rId5"/>
+    <p:sldId id="258" r:id="rId6"/>
+    <p:sldId id="259" r:id="rId7"/>
+    <p:sldId id="262" r:id="rId8"/>
+    <p:sldId id="263" r:id="rId9"/>
+    <p:sldId id="264" r:id="rId10"/>
+    <p:sldId id="266" r:id="rId11"/>
+    <p:sldId id="267" r:id="rId12"/>
+    <p:sldId id="268" r:id="rId13"/>
   </p:sldIdLst>
   <p:sldSz cx="9144000" cy="6858000" type="screen4x3"/>
   <p:notesSz cx="6858000" cy="9144000"/>
@@ -3189,6 +3197,698 @@
 </p:sld>
 </file>
 
+<file path=ppt/slides/slide10.xml><?xml version="1.0" encoding="utf-8"?>
+<p:sld xmlns:a="http://schemas.openxmlformats.org/drawingml/2006/main" xmlns:r="http://schemas.openxmlformats.org/officeDocument/2006/relationships" xmlns:p="http://schemas.openxmlformats.org/presentationml/2006/main">
+  <p:cSld>
+    <p:spTree>
+      <p:nvGrpSpPr>
+        <p:cNvPr id="1" name=""/>
+        <p:cNvGrpSpPr/>
+        <p:nvPr/>
+      </p:nvGrpSpPr>
+      <p:grpSpPr>
+        <a:xfrm>
+          <a:off x="0" y="0"/>
+          <a:ext cx="0" cy="0"/>
+          <a:chOff x="0" y="0"/>
+          <a:chExt cx="0" cy="0"/>
+        </a:xfrm>
+      </p:grpSpPr>
+      <p:sp>
+        <p:nvSpPr>
+          <p:cNvPr id="2" name="TextBox 1"/>
+          <p:cNvSpPr txBox="1"/>
+          <p:nvPr/>
+        </p:nvSpPr>
+        <p:spPr>
+          <a:xfrm>
+            <a:off x="762000" y="381000"/>
+            <a:ext cx="5325112" cy="646331"/>
+          </a:xfrm>
+          <a:prstGeom prst="rect">
+            <a:avLst/>
+          </a:prstGeom>
+          <a:noFill/>
+        </p:spPr>
+        <p:txBody>
+          <a:bodyPr wrap="none" rtlCol="0">
+            <a:spAutoFit/>
+          </a:bodyPr>
+          <a:lstStyle/>
+          <a:p>
+            <a:r>
+              <a:rPr lang="fr-FR" sz="3600" b="1" dirty="0" smtClean="0"/>
+              <a:t>1-  L’étiquette électronique</a:t>
+            </a:r>
+            <a:endParaRPr lang="fr-FR" sz="3600" b="1" dirty="0"/>
+          </a:p>
+        </p:txBody>
+      </p:sp>
+      <p:pic>
+        <p:nvPicPr>
+          <p:cNvPr id="2050" name="Picture 2"/>
+          <p:cNvPicPr>
+            <a:picLocks noChangeAspect="1" noChangeArrowheads="1"/>
+          </p:cNvPicPr>
+          <p:nvPr/>
+        </p:nvPicPr>
+        <p:blipFill>
+          <a:blip r:embed="rId2"/>
+          <a:srcRect/>
+          <a:stretch>
+            <a:fillRect/>
+          </a:stretch>
+        </p:blipFill>
+        <p:spPr bwMode="auto">
+          <a:xfrm>
+            <a:off x="2895600" y="2362200"/>
+            <a:ext cx="3352800" cy="1811594"/>
+          </a:xfrm>
+          <a:prstGeom prst="rect">
+            <a:avLst/>
+          </a:prstGeom>
+          <a:noFill/>
+          <a:ln w="9525">
+            <a:noFill/>
+            <a:miter lim="800000"/>
+            <a:headEnd/>
+            <a:tailEnd/>
+          </a:ln>
+          <a:effectLst/>
+        </p:spPr>
+      </p:pic>
+      <p:sp>
+        <p:nvSpPr>
+          <p:cNvPr id="4" name="TextBox 3"/>
+          <p:cNvSpPr txBox="1"/>
+          <p:nvPr/>
+        </p:nvSpPr>
+        <p:spPr>
+          <a:xfrm>
+            <a:off x="914400" y="1219200"/>
+            <a:ext cx="4264437" cy="369332"/>
+          </a:xfrm>
+          <a:prstGeom prst="rect">
+            <a:avLst/>
+          </a:prstGeom>
+          <a:noFill/>
+        </p:spPr>
+        <p:txBody>
+          <a:bodyPr wrap="none" rtlCol="0">
+            <a:spAutoFit/>
+          </a:bodyPr>
+          <a:lstStyle/>
+          <a:p>
+            <a:r>
+              <a:rPr lang="fr-FR" dirty="0" smtClean="0"/>
+              <a:t>Composée d’une puce reliée à une antenne</a:t>
+            </a:r>
+            <a:endParaRPr lang="fr-FR" dirty="0"/>
+          </a:p>
+        </p:txBody>
+      </p:sp>
+      <p:sp>
+        <p:nvSpPr>
+          <p:cNvPr id="5" name="TextBox 4"/>
+          <p:cNvSpPr txBox="1"/>
+          <p:nvPr/>
+        </p:nvSpPr>
+        <p:spPr>
+          <a:xfrm>
+            <a:off x="914400" y="1600200"/>
+            <a:ext cx="6019800" cy="369332"/>
+          </a:xfrm>
+          <a:prstGeom prst="rect">
+            <a:avLst/>
+          </a:prstGeom>
+          <a:noFill/>
+        </p:spPr>
+        <p:txBody>
+          <a:bodyPr wrap="square" rtlCol="0">
+            <a:spAutoFit/>
+          </a:bodyPr>
+          <a:lstStyle/>
+          <a:p>
+            <a:r>
+              <a:rPr lang="fr-FR" dirty="0" smtClean="0"/>
+              <a:t>Elle est lue par un lecteur qui capte et transmet l’information.</a:t>
+            </a:r>
+            <a:endParaRPr lang="fr-FR" dirty="0"/>
+          </a:p>
+        </p:txBody>
+      </p:sp>
+      <p:sp>
+        <p:nvSpPr>
+          <p:cNvPr id="6" name="TextBox 5"/>
+          <p:cNvSpPr txBox="1"/>
+          <p:nvPr/>
+        </p:nvSpPr>
+        <p:spPr>
+          <a:xfrm>
+            <a:off x="990600" y="4648200"/>
+            <a:ext cx="4184159" cy="369332"/>
+          </a:xfrm>
+          <a:prstGeom prst="rect">
+            <a:avLst/>
+          </a:prstGeom>
+          <a:noFill/>
+        </p:spPr>
+        <p:txBody>
+          <a:bodyPr wrap="none" rtlCol="0">
+            <a:spAutoFit/>
+          </a:bodyPr>
+          <a:lstStyle/>
+          <a:p>
+            <a:r>
+              <a:rPr lang="fr-FR" dirty="0" smtClean="0"/>
+              <a:t>On distingue 3 catégories d’étiquette RFID:</a:t>
+            </a:r>
+            <a:endParaRPr lang="fr-FR" dirty="0"/>
+          </a:p>
+        </p:txBody>
+      </p:sp>
+      <p:sp>
+        <p:nvSpPr>
+          <p:cNvPr id="7" name="TextBox 6"/>
+          <p:cNvSpPr txBox="1"/>
+          <p:nvPr/>
+        </p:nvSpPr>
+        <p:spPr>
+          <a:xfrm>
+            <a:off x="1066800" y="5105400"/>
+            <a:ext cx="4849404" cy="369332"/>
+          </a:xfrm>
+          <a:prstGeom prst="rect">
+            <a:avLst/>
+          </a:prstGeom>
+          <a:noFill/>
+        </p:spPr>
+        <p:txBody>
+          <a:bodyPr wrap="none" rtlCol="0">
+            <a:spAutoFit/>
+          </a:bodyPr>
+          <a:lstStyle/>
+          <a:p>
+            <a:r>
+              <a:rPr lang="fr-FR" dirty="0" smtClean="0"/>
+              <a:t>- Les étiquettes en lecture seule, non modifiables.</a:t>
+            </a:r>
+            <a:endParaRPr lang="fr-FR" dirty="0"/>
+          </a:p>
+        </p:txBody>
+      </p:sp>
+      <p:sp>
+        <p:nvSpPr>
+          <p:cNvPr id="8" name="TextBox 7"/>
+          <p:cNvSpPr txBox="1"/>
+          <p:nvPr/>
+        </p:nvSpPr>
+        <p:spPr>
+          <a:xfrm>
+            <a:off x="1066800" y="5486400"/>
+            <a:ext cx="4804649" cy="369332"/>
+          </a:xfrm>
+          <a:prstGeom prst="rect">
+            <a:avLst/>
+          </a:prstGeom>
+          <a:noFill/>
+        </p:spPr>
+        <p:txBody>
+          <a:bodyPr wrap="none" rtlCol="0">
+            <a:spAutoFit/>
+          </a:bodyPr>
+          <a:lstStyle/>
+          <a:p>
+            <a:r>
+              <a:rPr lang="fr-FR" dirty="0" smtClean="0"/>
+              <a:t>- Les étiquettes écriture une fois lecture multiple.</a:t>
+            </a:r>
+            <a:endParaRPr lang="fr-FR" dirty="0"/>
+          </a:p>
+        </p:txBody>
+      </p:sp>
+      <p:sp>
+        <p:nvSpPr>
+          <p:cNvPr id="9" name="TextBox 8"/>
+          <p:cNvSpPr txBox="1"/>
+          <p:nvPr/>
+        </p:nvSpPr>
+        <p:spPr>
+          <a:xfrm>
+            <a:off x="1066800" y="5867400"/>
+            <a:ext cx="3713261" cy="369332"/>
+          </a:xfrm>
+          <a:prstGeom prst="rect">
+            <a:avLst/>
+          </a:prstGeom>
+          <a:noFill/>
+        </p:spPr>
+        <p:txBody>
+          <a:bodyPr wrap="none" rtlCol="0">
+            <a:spAutoFit/>
+          </a:bodyPr>
+          <a:lstStyle/>
+          <a:p>
+            <a:r>
+              <a:rPr lang="fr-FR" dirty="0" smtClean="0"/>
+              <a:t>- Les étiquettes en lecture réécriture.</a:t>
+            </a:r>
+            <a:endParaRPr lang="fr-FR" dirty="0"/>
+          </a:p>
+        </p:txBody>
+      </p:sp>
+    </p:spTree>
+  </p:cSld>
+  <p:clrMapOvr>
+    <a:masterClrMapping/>
+  </p:clrMapOvr>
+</p:sld>
+</file>
+
+<file path=ppt/slides/slide11.xml><?xml version="1.0" encoding="utf-8"?>
+<p:sld xmlns:a="http://schemas.openxmlformats.org/drawingml/2006/main" xmlns:r="http://schemas.openxmlformats.org/officeDocument/2006/relationships" xmlns:p="http://schemas.openxmlformats.org/presentationml/2006/main">
+  <p:cSld>
+    <p:spTree>
+      <p:nvGrpSpPr>
+        <p:cNvPr id="1" name=""/>
+        <p:cNvGrpSpPr/>
+        <p:nvPr/>
+      </p:nvGrpSpPr>
+      <p:grpSpPr>
+        <a:xfrm>
+          <a:off x="0" y="0"/>
+          <a:ext cx="0" cy="0"/>
+          <a:chOff x="0" y="0"/>
+          <a:chExt cx="0" cy="0"/>
+        </a:xfrm>
+      </p:grpSpPr>
+      <p:sp>
+        <p:nvSpPr>
+          <p:cNvPr id="2" name="TextBox 1"/>
+          <p:cNvSpPr txBox="1"/>
+          <p:nvPr/>
+        </p:nvSpPr>
+        <p:spPr>
+          <a:xfrm>
+            <a:off x="609600" y="990600"/>
+            <a:ext cx="4473982" cy="369332"/>
+          </a:xfrm>
+          <a:prstGeom prst="rect">
+            <a:avLst/>
+          </a:prstGeom>
+          <a:noFill/>
+        </p:spPr>
+        <p:txBody>
+          <a:bodyPr wrap="none" rtlCol="0">
+            <a:spAutoFit/>
+          </a:bodyPr>
+          <a:lstStyle/>
+          <a:p>
+            <a:r>
+              <a:rPr lang="fr-FR" dirty="0" smtClean="0"/>
+              <a:t>Par ailleurs, il existe 3 types d’étiquettes RFID:</a:t>
+            </a:r>
+            <a:endParaRPr lang="fr-FR" dirty="0"/>
+          </a:p>
+        </p:txBody>
+      </p:sp>
+      <p:sp>
+        <p:nvSpPr>
+          <p:cNvPr id="3" name="TextBox 2"/>
+          <p:cNvSpPr txBox="1"/>
+          <p:nvPr/>
+        </p:nvSpPr>
+        <p:spPr>
+          <a:xfrm>
+            <a:off x="685800" y="1600200"/>
+            <a:ext cx="2466124" cy="369332"/>
+          </a:xfrm>
+          <a:prstGeom prst="rect">
+            <a:avLst/>
+          </a:prstGeom>
+          <a:noFill/>
+        </p:spPr>
+        <p:txBody>
+          <a:bodyPr wrap="none" rtlCol="0">
+            <a:spAutoFit/>
+          </a:bodyPr>
+          <a:lstStyle/>
+          <a:p>
+            <a:r>
+              <a:rPr lang="fr-FR" dirty="0" smtClean="0"/>
+              <a:t>- </a:t>
+            </a:r>
+            <a:r>
+              <a:rPr lang="fr-FR" b="1" dirty="0" smtClean="0"/>
+              <a:t>Les étiquettes actives</a:t>
+            </a:r>
+            <a:r>
+              <a:rPr lang="fr-FR" dirty="0" smtClean="0"/>
+              <a:t>: </a:t>
+            </a:r>
+            <a:endParaRPr lang="fr-FR" dirty="0"/>
+          </a:p>
+        </p:txBody>
+      </p:sp>
+      <p:sp>
+        <p:nvSpPr>
+          <p:cNvPr id="4" name="TextBox 3"/>
+          <p:cNvSpPr txBox="1"/>
+          <p:nvPr/>
+        </p:nvSpPr>
+        <p:spPr>
+          <a:xfrm>
+            <a:off x="609600" y="2057400"/>
+            <a:ext cx="8001000" cy="646331"/>
+          </a:xfrm>
+          <a:prstGeom prst="rect">
+            <a:avLst/>
+          </a:prstGeom>
+          <a:noFill/>
+        </p:spPr>
+        <p:txBody>
+          <a:bodyPr wrap="square" rtlCol="0">
+            <a:spAutoFit/>
+          </a:bodyPr>
+          <a:lstStyle/>
+          <a:p>
+            <a:r>
+              <a:rPr lang="fr-FR" dirty="0" smtClean="0"/>
+              <a:t>Alimentées par leur propre batterie. Elles créent leur propre signal et envoient régulièrement des informations.</a:t>
+            </a:r>
+            <a:endParaRPr lang="fr-FR" dirty="0"/>
+          </a:p>
+        </p:txBody>
+      </p:sp>
+      <p:sp>
+        <p:nvSpPr>
+          <p:cNvPr id="5" name="TextBox 4"/>
+          <p:cNvSpPr txBox="1"/>
+          <p:nvPr/>
+        </p:nvSpPr>
+        <p:spPr>
+          <a:xfrm>
+            <a:off x="685800" y="3048000"/>
+            <a:ext cx="2595967" cy="369332"/>
+          </a:xfrm>
+          <a:prstGeom prst="rect">
+            <a:avLst/>
+          </a:prstGeom>
+          <a:noFill/>
+        </p:spPr>
+        <p:txBody>
+          <a:bodyPr wrap="none" rtlCol="0">
+            <a:spAutoFit/>
+          </a:bodyPr>
+          <a:lstStyle/>
+          <a:p>
+            <a:r>
+              <a:rPr lang="fr-FR" dirty="0" smtClean="0"/>
+              <a:t>- </a:t>
+            </a:r>
+            <a:r>
+              <a:rPr lang="fr-FR" b="1" dirty="0" smtClean="0"/>
+              <a:t>Les étiquettes passives</a:t>
+            </a:r>
+            <a:r>
+              <a:rPr lang="fr-FR" dirty="0" smtClean="0"/>
+              <a:t>: </a:t>
+            </a:r>
+            <a:endParaRPr lang="fr-FR" dirty="0"/>
+          </a:p>
+        </p:txBody>
+      </p:sp>
+      <p:sp>
+        <p:nvSpPr>
+          <p:cNvPr id="6" name="TextBox 5"/>
+          <p:cNvSpPr txBox="1"/>
+          <p:nvPr/>
+        </p:nvSpPr>
+        <p:spPr>
+          <a:xfrm>
+            <a:off x="609600" y="3581400"/>
+            <a:ext cx="8001000" cy="646331"/>
+          </a:xfrm>
+          <a:prstGeom prst="rect">
+            <a:avLst/>
+          </a:prstGeom>
+          <a:noFill/>
+        </p:spPr>
+        <p:txBody>
+          <a:bodyPr wrap="square" rtlCol="0">
+            <a:spAutoFit/>
+          </a:bodyPr>
+          <a:lstStyle/>
+          <a:p>
+            <a:r>
+              <a:rPr lang="fr-FR" dirty="0" smtClean="0"/>
+              <a:t>Alimentées par le champs électromagnétique du lecteur. Elles ne font que répondre à des interrogations et à des requêtes d’un lecteur.</a:t>
+            </a:r>
+            <a:endParaRPr lang="fr-FR" dirty="0"/>
+          </a:p>
+        </p:txBody>
+      </p:sp>
+      <p:sp>
+        <p:nvSpPr>
+          <p:cNvPr id="7" name="TextBox 6"/>
+          <p:cNvSpPr txBox="1"/>
+          <p:nvPr/>
+        </p:nvSpPr>
+        <p:spPr>
+          <a:xfrm>
+            <a:off x="685800" y="4495800"/>
+            <a:ext cx="3116944" cy="369332"/>
+          </a:xfrm>
+          <a:prstGeom prst="rect">
+            <a:avLst/>
+          </a:prstGeom>
+          <a:noFill/>
+        </p:spPr>
+        <p:txBody>
+          <a:bodyPr wrap="none" rtlCol="0">
+            <a:spAutoFit/>
+          </a:bodyPr>
+          <a:lstStyle/>
+          <a:p>
+            <a:r>
+              <a:rPr lang="fr-FR" dirty="0" smtClean="0"/>
+              <a:t>- </a:t>
+            </a:r>
+            <a:r>
+              <a:rPr lang="fr-FR" b="1" dirty="0" smtClean="0"/>
+              <a:t>Les étiquettes semi-passives</a:t>
+            </a:r>
+            <a:r>
+              <a:rPr lang="fr-FR" dirty="0" smtClean="0"/>
+              <a:t>: </a:t>
+            </a:r>
+            <a:endParaRPr lang="fr-FR" dirty="0"/>
+          </a:p>
+        </p:txBody>
+      </p:sp>
+      <p:sp>
+        <p:nvSpPr>
+          <p:cNvPr id="8" name="TextBox 7"/>
+          <p:cNvSpPr txBox="1"/>
+          <p:nvPr/>
+        </p:nvSpPr>
+        <p:spPr>
+          <a:xfrm>
+            <a:off x="609600" y="4953000"/>
+            <a:ext cx="8001000" cy="646331"/>
+          </a:xfrm>
+          <a:prstGeom prst="rect">
+            <a:avLst/>
+          </a:prstGeom>
+          <a:noFill/>
+        </p:spPr>
+        <p:txBody>
+          <a:bodyPr wrap="square" rtlCol="0">
+            <a:spAutoFit/>
+          </a:bodyPr>
+          <a:lstStyle/>
+          <a:p>
+            <a:r>
+              <a:rPr lang="fr-FR" dirty="0" smtClean="0"/>
+              <a:t>Utilisent leur propre batterie pour le calcul interne, et l’énergie émise par le lecteur pour la communication.</a:t>
+            </a:r>
+            <a:endParaRPr lang="fr-FR" dirty="0"/>
+          </a:p>
+        </p:txBody>
+      </p:sp>
+    </p:spTree>
+  </p:cSld>
+  <p:clrMapOvr>
+    <a:masterClrMapping/>
+  </p:clrMapOvr>
+</p:sld>
+</file>
+
+<file path=ppt/slides/slide12.xml><?xml version="1.0" encoding="utf-8"?>
+<p:sld xmlns:a="http://schemas.openxmlformats.org/drawingml/2006/main" xmlns:r="http://schemas.openxmlformats.org/officeDocument/2006/relationships" xmlns:p="http://schemas.openxmlformats.org/presentationml/2006/main">
+  <p:cSld>
+    <p:spTree>
+      <p:nvGrpSpPr>
+        <p:cNvPr id="1" name=""/>
+        <p:cNvGrpSpPr/>
+        <p:nvPr/>
+      </p:nvGrpSpPr>
+      <p:grpSpPr>
+        <a:xfrm>
+          <a:off x="0" y="0"/>
+          <a:ext cx="0" cy="0"/>
+          <a:chOff x="0" y="0"/>
+          <a:chExt cx="0" cy="0"/>
+        </a:xfrm>
+      </p:grpSpPr>
+      <p:sp>
+        <p:nvSpPr>
+          <p:cNvPr id="2" name="TextBox 1"/>
+          <p:cNvSpPr txBox="1"/>
+          <p:nvPr/>
+        </p:nvSpPr>
+        <p:spPr>
+          <a:xfrm>
+            <a:off x="762000" y="838200"/>
+            <a:ext cx="2721386" cy="646331"/>
+          </a:xfrm>
+          <a:prstGeom prst="rect">
+            <a:avLst/>
+          </a:prstGeom>
+          <a:noFill/>
+        </p:spPr>
+        <p:txBody>
+          <a:bodyPr wrap="none" rtlCol="0">
+            <a:spAutoFit/>
+          </a:bodyPr>
+          <a:lstStyle/>
+          <a:p>
+            <a:r>
+              <a:rPr lang="fr-FR" sz="3600" b="1" dirty="0" smtClean="0"/>
+              <a:t>2</a:t>
+            </a:r>
+            <a:r>
+              <a:rPr lang="fr-FR" sz="3600" b="1" dirty="0" smtClean="0"/>
+              <a:t>-  Le Lecteur</a:t>
+            </a:r>
+            <a:endParaRPr lang="fr-FR" sz="3600" b="1" dirty="0"/>
+          </a:p>
+        </p:txBody>
+      </p:sp>
+      <p:sp>
+        <p:nvSpPr>
+          <p:cNvPr id="3" name="TextBox 2"/>
+          <p:cNvSpPr txBox="1"/>
+          <p:nvPr/>
+        </p:nvSpPr>
+        <p:spPr>
+          <a:xfrm>
+            <a:off x="762000" y="1676400"/>
+            <a:ext cx="7772400" cy="923330"/>
+          </a:xfrm>
+          <a:prstGeom prst="rect">
+            <a:avLst/>
+          </a:prstGeom>
+          <a:noFill/>
+        </p:spPr>
+        <p:txBody>
+          <a:bodyPr wrap="square" rtlCol="0">
+            <a:spAutoFit/>
+          </a:bodyPr>
+          <a:lstStyle/>
+          <a:p>
+            <a:r>
+              <a:rPr lang="fr-FR" dirty="0" smtClean="0"/>
+              <a:t>Envoi des ondes radios pour communiquer avec les étiquettes RFID. Il joue le rôle d’un émetteur / récepteur. Il convers les ondes radio en données pourront être lue par un logiciel.</a:t>
+            </a:r>
+            <a:endParaRPr lang="fr-FR" dirty="0"/>
+          </a:p>
+        </p:txBody>
+      </p:sp>
+      <p:sp>
+        <p:nvSpPr>
+          <p:cNvPr id="4" name="TextBox 3"/>
+          <p:cNvSpPr txBox="1"/>
+          <p:nvPr/>
+        </p:nvSpPr>
+        <p:spPr>
+          <a:xfrm>
+            <a:off x="762000" y="3810000"/>
+            <a:ext cx="3055773" cy="646331"/>
+          </a:xfrm>
+          <a:prstGeom prst="rect">
+            <a:avLst/>
+          </a:prstGeom>
+          <a:noFill/>
+        </p:spPr>
+        <p:txBody>
+          <a:bodyPr wrap="none" rtlCol="0">
+            <a:spAutoFit/>
+          </a:bodyPr>
+          <a:lstStyle/>
+          <a:p>
+            <a:r>
+              <a:rPr lang="fr-FR" sz="3600" b="1" dirty="0" smtClean="0"/>
+              <a:t>3-  L’ordinateur</a:t>
+            </a:r>
+            <a:endParaRPr lang="fr-FR" sz="3600" b="1" dirty="0"/>
+          </a:p>
+        </p:txBody>
+      </p:sp>
+      <p:sp>
+        <p:nvSpPr>
+          <p:cNvPr id="5" name="TextBox 4"/>
+          <p:cNvSpPr txBox="1"/>
+          <p:nvPr/>
+        </p:nvSpPr>
+        <p:spPr>
+          <a:xfrm>
+            <a:off x="762000" y="4572000"/>
+            <a:ext cx="7772400" cy="923330"/>
+          </a:xfrm>
+          <a:prstGeom prst="rect">
+            <a:avLst/>
+          </a:prstGeom>
+          <a:noFill/>
+        </p:spPr>
+        <p:txBody>
+          <a:bodyPr wrap="square" rtlCol="0">
+            <a:spAutoFit/>
+          </a:bodyPr>
+          <a:lstStyle/>
+          <a:p>
+            <a:r>
+              <a:rPr lang="fr-FR" dirty="0" smtClean="0"/>
+              <a:t>L’ordinateur doit être comporté d’un logiciel RFID pour assurer la gestion des données. </a:t>
+            </a:r>
+            <a:r>
+              <a:rPr lang="fr-FR" dirty="0" smtClean="0"/>
+              <a:t>Ce </a:t>
+            </a:r>
+            <a:r>
+              <a:rPr lang="fr-FR" dirty="0" smtClean="0"/>
+              <a:t>logiciel </a:t>
+            </a:r>
+            <a:r>
+              <a:rPr lang="fr-FR" dirty="0" smtClean="0"/>
+              <a:t>est </a:t>
+            </a:r>
+            <a:r>
+              <a:rPr lang="fr-FR" dirty="0" smtClean="0"/>
+              <a:t>nécessaire pour traiter les informations contenues dans les puces RFID, et les intégrer dans des bases de données de l’entreprise.</a:t>
+            </a:r>
+            <a:endParaRPr lang="fr-FR" dirty="0"/>
+          </a:p>
+        </p:txBody>
+      </p:sp>
+    </p:spTree>
+  </p:cSld>
+  <p:clrMapOvr>
+    <a:masterClrMapping/>
+  </p:clrMapOvr>
+</p:sld>
+</file>
+
 <file path=ppt/slides/slide2.xml><?xml version="1.0" encoding="utf-8"?>
 <p:sld xmlns:a="http://schemas.openxmlformats.org/drawingml/2006/main" xmlns:r="http://schemas.openxmlformats.org/officeDocument/2006/relationships" xmlns:p="http://schemas.openxmlformats.org/presentationml/2006/main">
   <p:cSld>
@@ -3206,64 +3906,54 @@
           <a:chExt cx="0" cy="0"/>
         </a:xfrm>
       </p:grpSpPr>
-      <p:sp>
-        <p:nvSpPr>
-          <p:cNvPr id="2" name="Title 1"/>
-          <p:cNvSpPr>
-            <a:spLocks noGrp="1"/>
-          </p:cNvSpPr>
-          <p:nvPr>
-            <p:ph type="title"/>
-          </p:nvPr>
-        </p:nvSpPr>
-        <p:spPr/>
-        <p:txBody>
-          <a:bodyPr/>
-          <a:lstStyle/>
-          <a:p>
-            <a:r>
-              <a:rPr lang="fr-FR" dirty="0" smtClean="0"/>
-              <a:t>La technologie RFID</a:t>
-            </a:r>
-            <a:endParaRPr lang="fr-FR" dirty="0"/>
-          </a:p>
-        </p:txBody>
-      </p:sp>
       <p:pic>
         <p:nvPicPr>
-          <p:cNvPr id="1026" name="Picture 2"/>
+          <p:cNvPr id="5" name="Content Placeholder 4" descr="rfid-intro.jpg"/>
           <p:cNvPicPr>
-            <a:picLocks noGrp="1" noChangeAspect="1" noChangeArrowheads="1"/>
+            <a:picLocks noGrp="1" noChangeAspect="1"/>
           </p:cNvPicPr>
           <p:nvPr>
             <p:ph idx="1"/>
           </p:nvPr>
         </p:nvPicPr>
         <p:blipFill>
-          <a:blip r:embed="rId2"/>
-          <a:srcRect/>
+          <a:blip r:embed="rId2">
+            <a:lum bright="10000"/>
+          </a:blip>
           <a:stretch>
             <a:fillRect/>
           </a:stretch>
         </p:blipFill>
-        <p:spPr bwMode="auto">
-          <a:xfrm>
-            <a:off x="1362075" y="2124869"/>
-            <a:ext cx="6419850" cy="3476625"/>
-          </a:xfrm>
-          <a:prstGeom prst="rect">
-            <a:avLst/>
-          </a:prstGeom>
-          <a:noFill/>
-          <a:ln w="9525">
-            <a:noFill/>
-            <a:miter lim="800000"/>
-            <a:headEnd/>
-            <a:tailEnd/>
-          </a:ln>
-          <a:effectLst/>
+        <p:spPr>
+          <a:xfrm>
+            <a:off x="0" y="1524000"/>
+            <a:ext cx="9144000" cy="5334000"/>
+          </a:xfrm>
         </p:spPr>
       </p:pic>
+      <p:sp>
+        <p:nvSpPr>
+          <p:cNvPr id="2" name="Title 1"/>
+          <p:cNvSpPr>
+            <a:spLocks noGrp="1"/>
+          </p:cNvSpPr>
+          <p:nvPr>
+            <p:ph type="title"/>
+          </p:nvPr>
+        </p:nvSpPr>
+        <p:spPr/>
+        <p:txBody>
+          <a:bodyPr/>
+          <a:lstStyle/>
+          <a:p>
+            <a:r>
+              <a:rPr lang="fr-FR" dirty="0" smtClean="0"/>
+              <a:t>La technologie RFID</a:t>
+            </a:r>
+            <a:endParaRPr lang="fr-FR" dirty="0"/>
+          </a:p>
+        </p:txBody>
+      </p:sp>
     </p:spTree>
   </p:cSld>
   <p:clrMapOvr>
@@ -3301,6 +3991,380 @@
         </p:nvSpPr>
         <p:spPr>
           <a:xfrm>
+            <a:off x="457200" y="2857500"/>
+            <a:ext cx="8229600" cy="1143000"/>
+          </a:xfrm>
+        </p:spPr>
+        <p:txBody>
+          <a:bodyPr>
+            <a:normAutofit fontScale="90000"/>
+          </a:bodyPr>
+          <a:lstStyle/>
+          <a:p>
+            <a:r>
+              <a:rPr lang="en-US" sz="7200" dirty="0" smtClean="0"/>
+              <a:t>Introduction</a:t>
+            </a:r>
+            <a:endParaRPr lang="en-US" sz="7200" dirty="0"/>
+          </a:p>
+        </p:txBody>
+      </p:sp>
+    </p:spTree>
+  </p:cSld>
+  <p:clrMapOvr>
+    <a:masterClrMapping/>
+  </p:clrMapOvr>
+</p:sld>
+</file>
+
+<file path=ppt/slides/slide4.xml><?xml version="1.0" encoding="utf-8"?>
+<p:sld xmlns:a="http://schemas.openxmlformats.org/drawingml/2006/main" xmlns:r="http://schemas.openxmlformats.org/officeDocument/2006/relationships" xmlns:p="http://schemas.openxmlformats.org/presentationml/2006/main">
+  <p:cSld>
+    <p:spTree>
+      <p:nvGrpSpPr>
+        <p:cNvPr id="1" name=""/>
+        <p:cNvGrpSpPr/>
+        <p:nvPr/>
+      </p:nvGrpSpPr>
+      <p:grpSpPr>
+        <a:xfrm>
+          <a:off x="0" y="0"/>
+          <a:ext cx="0" cy="0"/>
+          <a:chOff x="0" y="0"/>
+          <a:chExt cx="0" cy="0"/>
+        </a:xfrm>
+      </p:grpSpPr>
+      <p:pic>
+        <p:nvPicPr>
+          <p:cNvPr id="2" name="Picture 1" descr="barcode.jpg"/>
+          <p:cNvPicPr>
+            <a:picLocks noChangeAspect="1"/>
+          </p:cNvPicPr>
+          <p:nvPr/>
+        </p:nvPicPr>
+        <p:blipFill>
+          <a:blip r:embed="rId2"/>
+          <a:stretch>
+            <a:fillRect/>
+          </a:stretch>
+        </p:blipFill>
+        <p:spPr>
+          <a:xfrm>
+            <a:off x="3124200" y="457200"/>
+            <a:ext cx="5095875" cy="2314736"/>
+          </a:xfrm>
+          <a:prstGeom prst="rect">
+            <a:avLst/>
+          </a:prstGeom>
+        </p:spPr>
+      </p:pic>
+      <p:sp>
+        <p:nvSpPr>
+          <p:cNvPr id="3" name="TextBox 2"/>
+          <p:cNvSpPr txBox="1"/>
+          <p:nvPr/>
+        </p:nvSpPr>
+        <p:spPr>
+          <a:xfrm>
+            <a:off x="762000" y="457200"/>
+            <a:ext cx="3276600" cy="1200329"/>
+          </a:xfrm>
+          <a:prstGeom prst="rect">
+            <a:avLst/>
+          </a:prstGeom>
+        </p:spPr>
+        <p:style>
+          <a:lnRef idx="0">
+            <a:scrgbClr r="0" g="0" b="0"/>
+          </a:lnRef>
+          <a:fillRef idx="1001">
+            <a:schemeClr val="lt2"/>
+          </a:fillRef>
+          <a:effectRef idx="0">
+            <a:scrgbClr r="0" g="0" b="0"/>
+          </a:effectRef>
+          <a:fontRef idx="major"/>
+        </p:style>
+        <p:txBody>
+          <a:bodyPr wrap="square" rtlCol="0" anchor="ctr">
+            <a:spAutoFit/>
+          </a:bodyPr>
+          <a:lstStyle/>
+          <a:p>
+            <a:pPr algn="ctr"/>
+            <a:r>
+              <a:rPr lang="fr-FR" sz="2400" dirty="0" smtClean="0"/>
+              <a:t>Aujourd’hui chaque produit possède un code-barres</a:t>
+            </a:r>
+            <a:endParaRPr lang="fr-FR" sz="2400" dirty="0"/>
+          </a:p>
+        </p:txBody>
+      </p:sp>
+      <p:pic>
+        <p:nvPicPr>
+          <p:cNvPr id="4" name="Picture 3" descr="rfid.jpg"/>
+          <p:cNvPicPr>
+            <a:picLocks noChangeAspect="1"/>
+          </p:cNvPicPr>
+          <p:nvPr/>
+        </p:nvPicPr>
+        <p:blipFill>
+          <a:blip r:embed="rId3"/>
+          <a:stretch>
+            <a:fillRect/>
+          </a:stretch>
+        </p:blipFill>
+        <p:spPr>
+          <a:xfrm>
+            <a:off x="2438400" y="3657600"/>
+            <a:ext cx="6324600" cy="2875717"/>
+          </a:xfrm>
+          <a:prstGeom prst="rect">
+            <a:avLst/>
+          </a:prstGeom>
+        </p:spPr>
+      </p:pic>
+      <p:sp>
+        <p:nvSpPr>
+          <p:cNvPr id="5" name="TextBox 4"/>
+          <p:cNvSpPr txBox="1"/>
+          <p:nvPr/>
+        </p:nvSpPr>
+        <p:spPr>
+          <a:xfrm>
+            <a:off x="304800" y="2971800"/>
+            <a:ext cx="7656070" cy="523220"/>
+          </a:xfrm>
+          <a:prstGeom prst="rect">
+            <a:avLst/>
+          </a:prstGeom>
+          <a:noFill/>
+        </p:spPr>
+        <p:txBody>
+          <a:bodyPr wrap="none" rtlCol="0">
+            <a:spAutoFit/>
+          </a:bodyPr>
+          <a:lstStyle/>
+          <a:p>
+            <a:r>
+              <a:rPr lang="fr-FR" sz="2800" b="1" dirty="0" smtClean="0">
+                <a:solidFill>
+                  <a:srgbClr val="FFC000"/>
+                </a:solidFill>
+              </a:rPr>
+              <a:t>Que se passe t-il si </a:t>
+            </a:r>
+            <a:r>
+              <a:rPr lang="fr-FR" sz="2800" b="1" dirty="0" smtClean="0">
+                <a:solidFill>
+                  <a:srgbClr val="FFC000"/>
+                </a:solidFill>
+              </a:rPr>
+              <a:t>on remplace le code-barres </a:t>
+            </a:r>
+            <a:r>
+              <a:rPr lang="fr-FR" sz="2800" b="1" dirty="0" smtClean="0">
+                <a:solidFill>
+                  <a:srgbClr val="FFC000"/>
+                </a:solidFill>
+              </a:rPr>
+              <a:t>par</a:t>
+            </a:r>
+          </a:p>
+        </p:txBody>
+      </p:sp>
+      <p:sp>
+        <p:nvSpPr>
+          <p:cNvPr id="6" name="TextBox 5"/>
+          <p:cNvSpPr txBox="1"/>
+          <p:nvPr/>
+        </p:nvSpPr>
+        <p:spPr>
+          <a:xfrm>
+            <a:off x="457200" y="3657600"/>
+            <a:ext cx="1828800" cy="1107996"/>
+          </a:xfrm>
+          <a:prstGeom prst="rect">
+            <a:avLst/>
+          </a:prstGeom>
+          <a:noFill/>
+        </p:spPr>
+        <p:txBody>
+          <a:bodyPr wrap="square" rtlCol="0">
+            <a:spAutoFit/>
+          </a:bodyPr>
+          <a:lstStyle/>
+          <a:p>
+            <a:r>
+              <a:rPr lang="fr-FR" sz="6600" b="1" dirty="0" smtClean="0">
+                <a:solidFill>
+                  <a:srgbClr val="FFC000"/>
+                </a:solidFill>
+              </a:rPr>
+              <a:t>RFID</a:t>
+            </a:r>
+            <a:endParaRPr lang="fr-FR" sz="2800" b="1" dirty="0" smtClean="0">
+              <a:solidFill>
+                <a:srgbClr val="FFC000"/>
+              </a:solidFill>
+            </a:endParaRPr>
+          </a:p>
+        </p:txBody>
+      </p:sp>
+      <p:sp>
+        <p:nvSpPr>
+          <p:cNvPr id="7" name="TextBox 6"/>
+          <p:cNvSpPr txBox="1"/>
+          <p:nvPr/>
+        </p:nvSpPr>
+        <p:spPr>
+          <a:xfrm>
+            <a:off x="457200" y="4724400"/>
+            <a:ext cx="1828800" cy="1107996"/>
+          </a:xfrm>
+          <a:prstGeom prst="rect">
+            <a:avLst/>
+          </a:prstGeom>
+          <a:noFill/>
+        </p:spPr>
+        <p:txBody>
+          <a:bodyPr wrap="square" rtlCol="0">
+            <a:spAutoFit/>
+          </a:bodyPr>
+          <a:lstStyle/>
+          <a:p>
+            <a:pPr algn="ctr"/>
+            <a:r>
+              <a:rPr lang="fr-FR" sz="6600" b="1" dirty="0" smtClean="0">
+                <a:solidFill>
+                  <a:srgbClr val="FFC000"/>
+                </a:solidFill>
+              </a:rPr>
+              <a:t>??</a:t>
+            </a:r>
+            <a:endParaRPr lang="fr-FR" sz="2800" b="1" dirty="0" smtClean="0">
+              <a:solidFill>
+                <a:srgbClr val="FFC000"/>
+              </a:solidFill>
+            </a:endParaRPr>
+          </a:p>
+        </p:txBody>
+      </p:sp>
+      <p:sp>
+        <p:nvSpPr>
+          <p:cNvPr id="8" name="TextBox 7"/>
+          <p:cNvSpPr txBox="1"/>
+          <p:nvPr/>
+        </p:nvSpPr>
+        <p:spPr>
+          <a:xfrm>
+            <a:off x="3962400" y="3505200"/>
+            <a:ext cx="1828800" cy="1107996"/>
+          </a:xfrm>
+          <a:prstGeom prst="rect">
+            <a:avLst/>
+          </a:prstGeom>
+          <a:noFill/>
+        </p:spPr>
+        <p:txBody>
+          <a:bodyPr wrap="square" rtlCol="0">
+            <a:spAutoFit/>
+          </a:bodyPr>
+          <a:lstStyle/>
+          <a:p>
+            <a:pPr algn="ctr"/>
+            <a:r>
+              <a:rPr lang="fr-FR" sz="6600" b="1" dirty="0" smtClean="0">
+                <a:solidFill>
+                  <a:srgbClr val="FFC000"/>
+                </a:solidFill>
+              </a:rPr>
+              <a:t>??</a:t>
+            </a:r>
+            <a:endParaRPr lang="fr-FR" sz="2800" b="1" dirty="0" smtClean="0">
+              <a:solidFill>
+                <a:srgbClr val="FFC000"/>
+              </a:solidFill>
+            </a:endParaRPr>
+          </a:p>
+        </p:txBody>
+      </p:sp>
+      <p:sp>
+        <p:nvSpPr>
+          <p:cNvPr id="9" name="TextBox 8"/>
+          <p:cNvSpPr txBox="1"/>
+          <p:nvPr/>
+        </p:nvSpPr>
+        <p:spPr>
+          <a:xfrm>
+            <a:off x="7086600" y="5486400"/>
+            <a:ext cx="1828800" cy="1107996"/>
+          </a:xfrm>
+          <a:prstGeom prst="rect">
+            <a:avLst/>
+          </a:prstGeom>
+          <a:noFill/>
+        </p:spPr>
+        <p:txBody>
+          <a:bodyPr wrap="square" rtlCol="0">
+            <a:spAutoFit/>
+          </a:bodyPr>
+          <a:lstStyle/>
+          <a:p>
+            <a:pPr algn="ctr"/>
+            <a:r>
+              <a:rPr lang="fr-FR" sz="6600" b="1" dirty="0" smtClean="0">
+                <a:solidFill>
+                  <a:srgbClr val="FFC000"/>
+                </a:solidFill>
+              </a:rPr>
+              <a:t>??</a:t>
+            </a:r>
+            <a:endParaRPr lang="fr-FR" sz="2800" b="1" dirty="0" smtClean="0">
+              <a:solidFill>
+                <a:srgbClr val="FFC000"/>
+              </a:solidFill>
+            </a:endParaRPr>
+          </a:p>
+        </p:txBody>
+      </p:sp>
+    </p:spTree>
+  </p:cSld>
+  <p:clrMapOvr>
+    <a:masterClrMapping/>
+  </p:clrMapOvr>
+</p:sld>
+</file>
+
+<file path=ppt/slides/slide5.xml><?xml version="1.0" encoding="utf-8"?>
+<p:sld xmlns:a="http://schemas.openxmlformats.org/drawingml/2006/main" xmlns:r="http://schemas.openxmlformats.org/officeDocument/2006/relationships" xmlns:p="http://schemas.openxmlformats.org/presentationml/2006/main">
+  <p:cSld>
+    <p:spTree>
+      <p:nvGrpSpPr>
+        <p:cNvPr id="1" name=""/>
+        <p:cNvGrpSpPr/>
+        <p:nvPr/>
+      </p:nvGrpSpPr>
+      <p:grpSpPr>
+        <a:xfrm>
+          <a:off x="0" y="0"/>
+          <a:ext cx="0" cy="0"/>
+          <a:chOff x="0" y="0"/>
+          <a:chExt cx="0" cy="0"/>
+        </a:xfrm>
+      </p:grpSpPr>
+      <p:sp>
+        <p:nvSpPr>
+          <p:cNvPr id="2" name="Title 1"/>
+          <p:cNvSpPr>
+            <a:spLocks noGrp="1"/>
+          </p:cNvSpPr>
+          <p:nvPr>
+            <p:ph type="title"/>
+          </p:nvPr>
+        </p:nvSpPr>
+        <p:spPr>
+          <a:xfrm>
             <a:off x="685800" y="762000"/>
             <a:ext cx="4038600" cy="5334000"/>
           </a:xfrm>
@@ -3312,56 +4376,28 @@
           <a:lstStyle/>
           <a:p>
             <a:r>
-              <a:rPr lang="en-US" sz="9600" b="1" dirty="0" smtClean="0"/>
+              <a:rPr lang="fr-FR" sz="9600" b="1" dirty="0" smtClean="0"/>
               <a:t>RFID</a:t>
             </a:r>
             <a:r>
-              <a:rPr lang="en-US" sz="5400" dirty="0" smtClean="0"/>
+              <a:rPr lang="fr-FR" sz="5400" dirty="0" smtClean="0"/>
               <a:t/>
             </a:r>
             <a:br>
-              <a:rPr lang="en-US" sz="5400" dirty="0" smtClean="0"/>
+              <a:rPr lang="fr-FR" sz="5400" dirty="0" smtClean="0"/>
             </a:br>
             <a:r>
-              <a:rPr lang="en-US" sz="5400" dirty="0" smtClean="0"/>
+              <a:rPr lang="fr-FR" sz="5400" dirty="0" smtClean="0"/>
               <a:t/>
             </a:r>
             <a:br>
-              <a:rPr lang="en-US" sz="5400" dirty="0" smtClean="0"/>
+              <a:rPr lang="fr-FR" sz="5400" dirty="0" smtClean="0"/>
             </a:br>
             <a:r>
-              <a:rPr lang="en-US" sz="5400" dirty="0" err="1" smtClean="0"/>
-              <a:t>Qu’est</a:t>
-            </a:r>
-            <a:r>
-              <a:rPr lang="en-US" sz="5400" dirty="0" smtClean="0"/>
-              <a:t> </a:t>
-            </a:r>
-            <a:r>
-              <a:rPr lang="en-US" sz="5400" dirty="0" err="1" smtClean="0"/>
-              <a:t>ce</a:t>
-            </a:r>
-            <a:r>
-              <a:rPr lang="en-US" sz="5400" dirty="0" smtClean="0"/>
-              <a:t> </a:t>
-            </a:r>
-            <a:r>
-              <a:rPr lang="en-US" sz="5400" dirty="0" err="1" smtClean="0"/>
-              <a:t>que</a:t>
-            </a:r>
-            <a:r>
-              <a:rPr lang="en-US" sz="5400" dirty="0" smtClean="0"/>
-              <a:t> </a:t>
-            </a:r>
-            <a:r>
-              <a:rPr lang="en-US" sz="5400" dirty="0" err="1" smtClean="0"/>
-              <a:t>c’est</a:t>
-            </a:r>
-            <a:r>
-              <a:rPr lang="en-US" sz="5400" dirty="0" smtClean="0"/>
-              <a:t> ?</a:t>
-            </a:r>
-            <a:endParaRPr lang="en-US" sz="5400" dirty="0"/>
+              <a:rPr lang="fr-FR" sz="5400" dirty="0" smtClean="0"/>
+              <a:t>Qu’est ce que c’est ?</a:t>
+            </a:r>
+            <a:endParaRPr lang="fr-FR" sz="5400" dirty="0"/>
           </a:p>
         </p:txBody>
       </p:sp>
@@ -3584,7 +4620,7 @@
 </p:sld>
 </file>
 
-<file path=ppt/slides/slide4.xml><?xml version="1.0" encoding="utf-8"?>
+<file path=ppt/slides/slide6.xml><?xml version="1.0" encoding="utf-8"?>
 <p:sld xmlns:a="http://schemas.openxmlformats.org/drawingml/2006/main" xmlns:r="http://schemas.openxmlformats.org/officeDocument/2006/relationships" xmlns:p="http://schemas.openxmlformats.org/presentationml/2006/main">
   <p:cSld>
     <p:spTree>
@@ -3611,7 +4647,12 @@
             <p:ph type="title"/>
           </p:nvPr>
         </p:nvSpPr>
-        <p:spPr/>
+        <p:spPr>
+          <a:xfrm>
+            <a:off x="457200" y="1066800"/>
+            <a:ext cx="8229600" cy="1143000"/>
+          </a:xfrm>
+        </p:spPr>
         <p:txBody>
           <a:bodyPr>
             <a:noAutofit/>
@@ -3628,14 +4669,14 @@
       </p:sp>
       <p:sp>
         <p:nvSpPr>
-          <p:cNvPr id="4" name="TextBox 3"/>
+          <p:cNvPr id="30" name="TextBox 29"/>
           <p:cNvSpPr txBox="1"/>
           <p:nvPr/>
         </p:nvSpPr>
         <p:spPr>
           <a:xfrm>
-            <a:off x="1219200" y="1828800"/>
-            <a:ext cx="1404552" cy="707886"/>
+            <a:off x="838200" y="3429000"/>
+            <a:ext cx="7467599" cy="1697068"/>
           </a:xfrm>
           <a:prstGeom prst="rect">
             <a:avLst/>
@@ -3643,29 +4684,34 @@
           <a:noFill/>
         </p:spPr>
         <p:txBody>
-          <a:bodyPr wrap="none" rtlCol="0">
+          <a:bodyPr wrap="square" rtlCol="0">
             <a:spAutoFit/>
           </a:bodyPr>
           <a:lstStyle/>
           <a:p>
-            <a:r>
-              <a:rPr lang="en-US" sz="4000" dirty="0" smtClean="0"/>
-              <a:t>Radio</a:t>
-            </a:r>
-            <a:endParaRPr lang="en-US" sz="4000" dirty="0"/>
-          </a:p>
-        </p:txBody>
-      </p:sp>
-      <p:sp>
-        <p:nvSpPr>
-          <p:cNvPr id="5" name="TextBox 4"/>
+            <a:pPr algn="ctr">
+              <a:lnSpc>
+                <a:spcPct val="150000"/>
+              </a:lnSpc>
+            </a:pPr>
+            <a:r>
+              <a:rPr lang="fr-FR" sz="2400" dirty="0" smtClean="0"/>
+              <a:t>Sans contact physique ni visuel cette technologie permet d’identifier d’une façon unique l’objet ou la personne qui porte l’étiquette.</a:t>
+            </a:r>
+            <a:endParaRPr lang="en-US" sz="2400" dirty="0"/>
+          </a:p>
+        </p:txBody>
+      </p:sp>
+      <p:sp>
+        <p:nvSpPr>
+          <p:cNvPr id="10" name="TextBox 9"/>
           <p:cNvSpPr txBox="1"/>
           <p:nvPr/>
         </p:nvSpPr>
         <p:spPr>
           <a:xfrm>
-            <a:off x="2590800" y="2667000"/>
-            <a:ext cx="2359620" cy="707886"/>
+            <a:off x="2122419" y="2209800"/>
+            <a:ext cx="4899162" cy="523220"/>
           </a:xfrm>
           <a:prstGeom prst="rect">
             <a:avLst/>
@@ -3679,178 +4725,38 @@
           <a:lstStyle/>
           <a:p>
             <a:r>
-              <a:rPr lang="en-US" sz="4000" dirty="0" smtClean="0"/>
-              <a:t>Frequency</a:t>
-            </a:r>
-            <a:endParaRPr lang="en-US" sz="4000" dirty="0"/>
-          </a:p>
-        </p:txBody>
-      </p:sp>
-      <p:sp>
-        <p:nvSpPr>
-          <p:cNvPr id="6" name="TextBox 5"/>
-          <p:cNvSpPr txBox="1"/>
-          <p:nvPr/>
-        </p:nvSpPr>
-        <p:spPr>
-          <a:xfrm>
-            <a:off x="5715000" y="2286000"/>
-            <a:ext cx="2947345" cy="707886"/>
-          </a:xfrm>
-          <a:prstGeom prst="rect">
-            <a:avLst/>
-          </a:prstGeom>
-          <a:noFill/>
-        </p:spPr>
-        <p:txBody>
-          <a:bodyPr wrap="none" rtlCol="0">
-            <a:spAutoFit/>
-          </a:bodyPr>
-          <a:lstStyle/>
-          <a:p>
-            <a:r>
-              <a:rPr lang="en-US" sz="4000" dirty="0" smtClean="0"/>
-              <a:t>Identification</a:t>
-            </a:r>
-            <a:endParaRPr lang="en-US" sz="4000" dirty="0"/>
-          </a:p>
-        </p:txBody>
-      </p:sp>
-      <p:cxnSp>
-        <p:nvCxnSpPr>
-          <p:cNvPr id="8" name="Straight Arrow Connector 7"/>
-          <p:cNvCxnSpPr/>
-          <p:nvPr/>
-        </p:nvCxnSpPr>
-        <p:spPr>
-          <a:xfrm rot="10800000" flipV="1">
-            <a:off x="2514600" y="1447800"/>
-            <a:ext cx="762000" cy="533400"/>
-          </a:xfrm>
-          <a:prstGeom prst="straightConnector1">
-            <a:avLst/>
-          </a:prstGeom>
-          <a:ln>
-            <a:tailEnd type="arrow"/>
-          </a:ln>
-        </p:spPr>
-        <p:style>
-          <a:lnRef idx="3">
-            <a:schemeClr val="accent6"/>
-          </a:lnRef>
-          <a:fillRef idx="0">
-            <a:schemeClr val="accent6"/>
-          </a:fillRef>
-          <a:effectRef idx="2">
-            <a:schemeClr val="accent6"/>
-          </a:effectRef>
-          <a:fontRef idx="minor">
-            <a:schemeClr val="tx1"/>
-          </a:fontRef>
-        </p:style>
-      </p:cxnSp>
-      <p:cxnSp>
-        <p:nvCxnSpPr>
-          <p:cNvPr id="11" name="Straight Arrow Connector 10"/>
-          <p:cNvCxnSpPr/>
-          <p:nvPr/>
-        </p:nvCxnSpPr>
-        <p:spPr>
-          <a:xfrm rot="5400000">
-            <a:off x="3467100" y="1943100"/>
-            <a:ext cx="1143000" cy="304800"/>
-          </a:xfrm>
-          <a:prstGeom prst="straightConnector1">
-            <a:avLst/>
-          </a:prstGeom>
-          <a:ln>
-            <a:tailEnd type="arrow"/>
-          </a:ln>
-        </p:spPr>
-        <p:style>
-          <a:lnRef idx="3">
-            <a:schemeClr val="accent6"/>
-          </a:lnRef>
-          <a:fillRef idx="0">
-            <a:schemeClr val="accent6"/>
-          </a:fillRef>
-          <a:effectRef idx="2">
-            <a:schemeClr val="accent6"/>
-          </a:effectRef>
-          <a:fontRef idx="minor">
-            <a:schemeClr val="tx1"/>
-          </a:fontRef>
-        </p:style>
-      </p:cxnSp>
-      <p:cxnSp>
-        <p:nvCxnSpPr>
-          <p:cNvPr id="13" name="Straight Arrow Connector 12"/>
-          <p:cNvCxnSpPr/>
-          <p:nvPr/>
-        </p:nvCxnSpPr>
-        <p:spPr>
-          <a:xfrm>
-            <a:off x="5105400" y="1447800"/>
-            <a:ext cx="1143000" cy="762000"/>
-          </a:xfrm>
-          <a:prstGeom prst="straightConnector1">
-            <a:avLst/>
-          </a:prstGeom>
-          <a:ln>
-            <a:tailEnd type="arrow"/>
-          </a:ln>
-        </p:spPr>
-        <p:style>
-          <a:lnRef idx="3">
-            <a:schemeClr val="accent6"/>
-          </a:lnRef>
-          <a:fillRef idx="0">
-            <a:schemeClr val="accent6"/>
-          </a:fillRef>
-          <a:effectRef idx="2">
-            <a:schemeClr val="accent6"/>
-          </a:effectRef>
-          <a:fontRef idx="minor">
-            <a:schemeClr val="tx1"/>
-          </a:fontRef>
-        </p:style>
-      </p:cxnSp>
-      <p:sp>
-        <p:nvSpPr>
-          <p:cNvPr id="30" name="TextBox 29"/>
-          <p:cNvSpPr txBox="1"/>
-          <p:nvPr/>
-        </p:nvSpPr>
-        <p:spPr>
-          <a:xfrm>
-            <a:off x="838200" y="3962400"/>
-            <a:ext cx="7467599" cy="2251065"/>
-          </a:xfrm>
-          <a:prstGeom prst="rect">
-            <a:avLst/>
-          </a:prstGeom>
-          <a:noFill/>
-        </p:spPr>
-        <p:txBody>
-          <a:bodyPr wrap="square" rtlCol="0">
-            <a:spAutoFit/>
-          </a:bodyPr>
-          <a:lstStyle/>
-          <a:p>
-            <a:pPr>
-              <a:lnSpc>
-                <a:spcPct val="150000"/>
-              </a:lnSpc>
-            </a:pPr>
-            <a:r>
-              <a:rPr lang="fr-FR" sz="2400" dirty="0" smtClean="0"/>
-              <a:t>C’est </a:t>
-            </a:r>
-            <a:r>
-              <a:rPr lang="fr-FR" sz="2400" dirty="0" smtClean="0"/>
-              <a:t>une technologie permettant d’échanger les données par radio fréquence avec des objets à distance, dans le but de les identifier, de les tracer, de les localiser, d’y enregistrer des informations.</a:t>
-            </a:r>
-            <a:endParaRPr lang="en-US" sz="2400" dirty="0"/>
+              <a:rPr lang="en-US" sz="2800" dirty="0" smtClean="0"/>
+              <a:t>(</a:t>
+            </a:r>
+            <a:r>
+              <a:rPr lang="en-US" sz="2800" b="1" dirty="0" smtClean="0"/>
+              <a:t>R</a:t>
+            </a:r>
+            <a:r>
+              <a:rPr lang="en-US" sz="2800" dirty="0" smtClean="0"/>
+              <a:t>adio </a:t>
+            </a:r>
+            <a:r>
+              <a:rPr lang="en-US" sz="2800" b="1" dirty="0" smtClean="0"/>
+              <a:t>F</a:t>
+            </a:r>
+            <a:r>
+              <a:rPr lang="en-US" sz="2800" dirty="0" smtClean="0"/>
+              <a:t>requency </a:t>
+            </a:r>
+            <a:r>
+              <a:rPr lang="en-US" sz="2800" b="1" dirty="0" err="1" smtClean="0"/>
+              <a:t>ID</a:t>
+            </a:r>
+            <a:r>
+              <a:rPr lang="en-US" sz="2800" dirty="0" err="1" smtClean="0"/>
+              <a:t>entification</a:t>
+            </a:r>
+            <a:r>
+              <a:rPr lang="en-US" sz="2800" dirty="0" smtClean="0"/>
+              <a:t>)</a:t>
+            </a:r>
+            <a:endParaRPr lang="en-US" sz="2800" dirty="0"/>
           </a:p>
         </p:txBody>
       </p:sp>
@@ -3866,6 +4772,455 @@
       </p:par>
     </p:tnLst>
   </p:timing>
+</p:sld>
+</file>
+
+<file path=ppt/slides/slide7.xml><?xml version="1.0" encoding="utf-8"?>
+<p:sld xmlns:a="http://schemas.openxmlformats.org/drawingml/2006/main" xmlns:r="http://schemas.openxmlformats.org/officeDocument/2006/relationships" xmlns:p="http://schemas.openxmlformats.org/presentationml/2006/main">
+  <p:cSld>
+    <p:spTree>
+      <p:nvGrpSpPr>
+        <p:cNvPr id="1" name=""/>
+        <p:cNvGrpSpPr/>
+        <p:nvPr/>
+      </p:nvGrpSpPr>
+      <p:grpSpPr>
+        <a:xfrm>
+          <a:off x="0" y="0"/>
+          <a:ext cx="0" cy="0"/>
+          <a:chOff x="0" y="0"/>
+          <a:chExt cx="0" cy="0"/>
+        </a:xfrm>
+      </p:grpSpPr>
+      <p:sp>
+        <p:nvSpPr>
+          <p:cNvPr id="2" name="Title 1"/>
+          <p:cNvSpPr>
+            <a:spLocks noGrp="1"/>
+          </p:cNvSpPr>
+          <p:nvPr>
+            <p:ph type="title"/>
+          </p:nvPr>
+        </p:nvSpPr>
+        <p:spPr>
+          <a:xfrm>
+            <a:off x="457200" y="2857500"/>
+            <a:ext cx="8229600" cy="1143000"/>
+          </a:xfrm>
+        </p:spPr>
+        <p:txBody>
+          <a:bodyPr>
+            <a:normAutofit/>
+          </a:bodyPr>
+          <a:lstStyle/>
+          <a:p>
+            <a:r>
+              <a:rPr lang="fr-FR" sz="6600" dirty="0" smtClean="0"/>
+              <a:t>Historique</a:t>
+            </a:r>
+            <a:endParaRPr lang="fr-FR" sz="6600" dirty="0"/>
+          </a:p>
+        </p:txBody>
+      </p:sp>
+    </p:spTree>
+  </p:cSld>
+  <p:clrMapOvr>
+    <a:masterClrMapping/>
+  </p:clrMapOvr>
+</p:sld>
+</file>
+
+<file path=ppt/slides/slide8.xml><?xml version="1.0" encoding="utf-8"?>
+<p:sld xmlns:a="http://schemas.openxmlformats.org/drawingml/2006/main" xmlns:r="http://schemas.openxmlformats.org/officeDocument/2006/relationships" xmlns:p="http://schemas.openxmlformats.org/presentationml/2006/main">
+  <p:cSld>
+    <p:spTree>
+      <p:nvGrpSpPr>
+        <p:cNvPr id="1" name=""/>
+        <p:cNvGrpSpPr/>
+        <p:nvPr/>
+      </p:nvGrpSpPr>
+      <p:grpSpPr>
+        <a:xfrm>
+          <a:off x="0" y="0"/>
+          <a:ext cx="0" cy="0"/>
+          <a:chOff x="0" y="0"/>
+          <a:chExt cx="0" cy="0"/>
+        </a:xfrm>
+      </p:grpSpPr>
+      <p:pic>
+        <p:nvPicPr>
+          <p:cNvPr id="12" name="Picture 11" descr="Tribune-2015-logistique-sera-innovante-sera-pas--F.jpg"/>
+          <p:cNvPicPr>
+            <a:picLocks noChangeAspect="1"/>
+          </p:cNvPicPr>
+          <p:nvPr/>
+        </p:nvPicPr>
+        <p:blipFill>
+          <a:blip r:embed="rId2" cstate="print"/>
+          <a:stretch>
+            <a:fillRect/>
+          </a:stretch>
+        </p:blipFill>
+        <p:spPr>
+          <a:xfrm>
+            <a:off x="5867400" y="4114800"/>
+            <a:ext cx="2920080" cy="2541390"/>
+          </a:xfrm>
+          <a:prstGeom prst="rect">
+            <a:avLst/>
+          </a:prstGeom>
+        </p:spPr>
+      </p:pic>
+      <p:pic>
+        <p:nvPicPr>
+          <p:cNvPr id="2" name="Picture 1" descr="ecafe60b8a1582866eb7a831fa74c614.jpg"/>
+          <p:cNvPicPr>
+            <a:picLocks noChangeAspect="1"/>
+          </p:cNvPicPr>
+          <p:nvPr/>
+        </p:nvPicPr>
+        <p:blipFill>
+          <a:blip r:embed="rId3">
+            <a:lum bright="10000"/>
+          </a:blip>
+          <a:stretch>
+            <a:fillRect/>
+          </a:stretch>
+        </p:blipFill>
+        <p:spPr>
+          <a:xfrm>
+            <a:off x="4953000" y="0"/>
+            <a:ext cx="3862873" cy="2057400"/>
+          </a:xfrm>
+          <a:prstGeom prst="rect">
+            <a:avLst/>
+          </a:prstGeom>
+        </p:spPr>
+      </p:pic>
+      <p:sp>
+        <p:nvSpPr>
+          <p:cNvPr id="3" name="TextBox 2"/>
+          <p:cNvSpPr txBox="1"/>
+          <p:nvPr/>
+        </p:nvSpPr>
+        <p:spPr>
+          <a:xfrm>
+            <a:off x="685800" y="381000"/>
+            <a:ext cx="1236236" cy="584775"/>
+          </a:xfrm>
+          <a:prstGeom prst="rect">
+            <a:avLst/>
+          </a:prstGeom>
+          <a:noFill/>
+        </p:spPr>
+        <p:txBody>
+          <a:bodyPr wrap="none" rtlCol="0">
+            <a:spAutoFit/>
+          </a:bodyPr>
+          <a:lstStyle/>
+          <a:p>
+            <a:r>
+              <a:rPr lang="en-US" sz="3200" b="1" dirty="0" smtClean="0"/>
+              <a:t>- 1930</a:t>
+            </a:r>
+            <a:endParaRPr lang="en-US" sz="3200" b="1" dirty="0"/>
+          </a:p>
+        </p:txBody>
+      </p:sp>
+      <p:sp>
+        <p:nvSpPr>
+          <p:cNvPr id="4" name="TextBox 3"/>
+          <p:cNvSpPr txBox="1"/>
+          <p:nvPr/>
+        </p:nvSpPr>
+        <p:spPr>
+          <a:xfrm>
+            <a:off x="685800" y="990600"/>
+            <a:ext cx="4343400" cy="923330"/>
+          </a:xfrm>
+          <a:prstGeom prst="rect">
+            <a:avLst/>
+          </a:prstGeom>
+          <a:noFill/>
+        </p:spPr>
+        <p:txBody>
+          <a:bodyPr wrap="square" rtlCol="0">
+            <a:spAutoFit/>
+          </a:bodyPr>
+          <a:lstStyle/>
+          <a:p>
+            <a:r>
+              <a:rPr lang="fr-FR" dirty="0" smtClean="0"/>
+              <a:t>RFID est utilisée pour la première fois lors de la seconde guerre mondiale pour identifier et authentifier des appareils en vol.</a:t>
+            </a:r>
+            <a:endParaRPr lang="fr-FR" dirty="0"/>
+          </a:p>
+        </p:txBody>
+      </p:sp>
+      <p:sp>
+        <p:nvSpPr>
+          <p:cNvPr id="5" name="TextBox 4"/>
+          <p:cNvSpPr txBox="1"/>
+          <p:nvPr/>
+        </p:nvSpPr>
+        <p:spPr>
+          <a:xfrm>
+            <a:off x="685800" y="2286000"/>
+            <a:ext cx="1236236" cy="584775"/>
+          </a:xfrm>
+          <a:prstGeom prst="rect">
+            <a:avLst/>
+          </a:prstGeom>
+          <a:noFill/>
+        </p:spPr>
+        <p:txBody>
+          <a:bodyPr wrap="none" rtlCol="0">
+            <a:spAutoFit/>
+          </a:bodyPr>
+          <a:lstStyle/>
+          <a:p>
+            <a:r>
+              <a:rPr lang="en-US" sz="3200" b="1" dirty="0" smtClean="0"/>
+              <a:t>- 1970</a:t>
+            </a:r>
+            <a:endParaRPr lang="en-US" sz="3200" b="1" dirty="0"/>
+          </a:p>
+        </p:txBody>
+      </p:sp>
+      <p:sp>
+        <p:nvSpPr>
+          <p:cNvPr id="6" name="TextBox 5"/>
+          <p:cNvSpPr txBox="1"/>
+          <p:nvPr/>
+        </p:nvSpPr>
+        <p:spPr>
+          <a:xfrm>
+            <a:off x="685800" y="2895600"/>
+            <a:ext cx="4648200" cy="646331"/>
+          </a:xfrm>
+          <a:prstGeom prst="rect">
+            <a:avLst/>
+          </a:prstGeom>
+          <a:noFill/>
+        </p:spPr>
+        <p:txBody>
+          <a:bodyPr wrap="square" rtlCol="0">
+            <a:spAutoFit/>
+          </a:bodyPr>
+          <a:lstStyle/>
+          <a:p>
+            <a:r>
+              <a:rPr lang="fr-FR" dirty="0" smtClean="0"/>
+              <a:t>RFID est transférée vers le secteur commerciale pour l’identification des bétail en Europe.</a:t>
+            </a:r>
+            <a:endParaRPr lang="fr-FR" dirty="0"/>
+          </a:p>
+        </p:txBody>
+      </p:sp>
+      <p:pic>
+        <p:nvPicPr>
+          <p:cNvPr id="7" name="Picture 6" descr="csm_ACTU_Ede-fin-livraison-Orne_f40e8eab72.jpg"/>
+          <p:cNvPicPr>
+            <a:picLocks noChangeAspect="1"/>
+          </p:cNvPicPr>
+          <p:nvPr/>
+        </p:nvPicPr>
+        <p:blipFill>
+          <a:blip r:embed="rId4"/>
+          <a:stretch>
+            <a:fillRect/>
+          </a:stretch>
+        </p:blipFill>
+        <p:spPr>
+          <a:xfrm>
+            <a:off x="5943600" y="2362200"/>
+            <a:ext cx="2209800" cy="1325880"/>
+          </a:xfrm>
+          <a:prstGeom prst="rect">
+            <a:avLst/>
+          </a:prstGeom>
+        </p:spPr>
+      </p:pic>
+      <p:sp>
+        <p:nvSpPr>
+          <p:cNvPr id="8" name="TextBox 7"/>
+          <p:cNvSpPr txBox="1"/>
+          <p:nvPr/>
+        </p:nvSpPr>
+        <p:spPr>
+          <a:xfrm>
+            <a:off x="685800" y="3886200"/>
+            <a:ext cx="1236236" cy="584775"/>
+          </a:xfrm>
+          <a:prstGeom prst="rect">
+            <a:avLst/>
+          </a:prstGeom>
+          <a:noFill/>
+        </p:spPr>
+        <p:txBody>
+          <a:bodyPr wrap="none" rtlCol="0">
+            <a:spAutoFit/>
+          </a:bodyPr>
+          <a:lstStyle/>
+          <a:p>
+            <a:r>
+              <a:rPr lang="en-US" sz="3200" b="1" dirty="0" smtClean="0"/>
+              <a:t>- 1990</a:t>
+            </a:r>
+            <a:endParaRPr lang="en-US" sz="3200" b="1" dirty="0"/>
+          </a:p>
+        </p:txBody>
+      </p:sp>
+      <p:sp>
+        <p:nvSpPr>
+          <p:cNvPr id="9" name="TextBox 8"/>
+          <p:cNvSpPr txBox="1"/>
+          <p:nvPr/>
+        </p:nvSpPr>
+        <p:spPr>
+          <a:xfrm>
+            <a:off x="685800" y="4495800"/>
+            <a:ext cx="5410200" cy="369332"/>
+          </a:xfrm>
+          <a:prstGeom prst="rect">
+            <a:avLst/>
+          </a:prstGeom>
+          <a:noFill/>
+        </p:spPr>
+        <p:txBody>
+          <a:bodyPr wrap="square" rtlCol="0">
+            <a:spAutoFit/>
+          </a:bodyPr>
+          <a:lstStyle/>
+          <a:p>
+            <a:r>
+              <a:rPr lang="fr-FR" dirty="0" smtClean="0"/>
+              <a:t>Début de standardisation des équipements RFID.</a:t>
+            </a:r>
+            <a:endParaRPr lang="fr-FR" dirty="0"/>
+          </a:p>
+        </p:txBody>
+      </p:sp>
+      <p:sp>
+        <p:nvSpPr>
+          <p:cNvPr id="10" name="TextBox 9"/>
+          <p:cNvSpPr txBox="1"/>
+          <p:nvPr/>
+        </p:nvSpPr>
+        <p:spPr>
+          <a:xfrm>
+            <a:off x="762000" y="5181600"/>
+            <a:ext cx="1236236" cy="584775"/>
+          </a:xfrm>
+          <a:prstGeom prst="rect">
+            <a:avLst/>
+          </a:prstGeom>
+          <a:noFill/>
+        </p:spPr>
+        <p:txBody>
+          <a:bodyPr wrap="none" rtlCol="0">
+            <a:spAutoFit/>
+          </a:bodyPr>
+          <a:lstStyle/>
+          <a:p>
+            <a:r>
+              <a:rPr lang="en-US" sz="3200" b="1" dirty="0" smtClean="0"/>
+              <a:t>- 2005</a:t>
+            </a:r>
+            <a:endParaRPr lang="en-US" sz="3200" b="1" dirty="0"/>
+          </a:p>
+        </p:txBody>
+      </p:sp>
+      <p:sp>
+        <p:nvSpPr>
+          <p:cNvPr id="11" name="TextBox 10"/>
+          <p:cNvSpPr txBox="1"/>
+          <p:nvPr/>
+        </p:nvSpPr>
+        <p:spPr>
+          <a:xfrm>
+            <a:off x="762000" y="5791200"/>
+            <a:ext cx="5410200" cy="646331"/>
+          </a:xfrm>
+          <a:prstGeom prst="rect">
+            <a:avLst/>
+          </a:prstGeom>
+          <a:noFill/>
+        </p:spPr>
+        <p:txBody>
+          <a:bodyPr wrap="square" rtlCol="0">
+            <a:spAutoFit/>
+          </a:bodyPr>
+          <a:lstStyle/>
+          <a:p>
+            <a:r>
+              <a:rPr lang="fr-FR" dirty="0" smtClean="0"/>
+              <a:t>Commercialisation en masse des systèmes RFID, dans le domaine de la logistique et de la traçabilité. </a:t>
+            </a:r>
+            <a:endParaRPr lang="fr-FR" dirty="0"/>
+          </a:p>
+        </p:txBody>
+      </p:sp>
+    </p:spTree>
+  </p:cSld>
+  <p:clrMapOvr>
+    <a:masterClrMapping/>
+  </p:clrMapOvr>
+</p:sld>
+</file>
+
+<file path=ppt/slides/slide9.xml><?xml version="1.0" encoding="utf-8"?>
+<p:sld xmlns:a="http://schemas.openxmlformats.org/drawingml/2006/main" xmlns:r="http://schemas.openxmlformats.org/officeDocument/2006/relationships" xmlns:p="http://schemas.openxmlformats.org/presentationml/2006/main">
+  <p:cSld>
+    <p:spTree>
+      <p:nvGrpSpPr>
+        <p:cNvPr id="1" name=""/>
+        <p:cNvGrpSpPr/>
+        <p:nvPr/>
+      </p:nvGrpSpPr>
+      <p:grpSpPr>
+        <a:xfrm>
+          <a:off x="0" y="0"/>
+          <a:ext cx="0" cy="0"/>
+          <a:chOff x="0" y="0"/>
+          <a:chExt cx="0" cy="0"/>
+        </a:xfrm>
+      </p:grpSpPr>
+      <p:sp>
+        <p:nvSpPr>
+          <p:cNvPr id="2" name="Title 1"/>
+          <p:cNvSpPr>
+            <a:spLocks noGrp="1"/>
+          </p:cNvSpPr>
+          <p:nvPr>
+            <p:ph type="title"/>
+          </p:nvPr>
+        </p:nvSpPr>
+        <p:spPr>
+          <a:xfrm>
+            <a:off x="457200" y="2309019"/>
+            <a:ext cx="8229600" cy="2239962"/>
+          </a:xfrm>
+        </p:spPr>
+        <p:txBody>
+          <a:bodyPr>
+            <a:noAutofit/>
+          </a:bodyPr>
+          <a:lstStyle/>
+          <a:p>
+            <a:r>
+              <a:rPr lang="fr-FR" sz="6600" dirty="0" smtClean="0"/>
+              <a:t>Les composants d’un système RFID</a:t>
+            </a:r>
+            <a:endParaRPr lang="fr-FR" sz="6600" dirty="0"/>
+          </a:p>
+        </p:txBody>
+      </p:sp>
+    </p:spTree>
+  </p:cSld>
+  <p:clrMapOvr>
+    <a:masterClrMapping/>
+  </p:clrMapOvr>
 </p:sld>
 </file>
 

</xml_diff>